<commit_message>
mcp codebase is added + slides
</commit_message>
<xml_diff>
--- a/Slides/VBYO_day3_afternoon_mcp.pptx
+++ b/Slides/VBYO_day3_afternoon_mcp.pptx
@@ -5,7 +5,7 @@
     <p:sldMasterId id="2147483708" r:id="rId1"/>
   </p:sldMasterIdLst>
   <p:notesMasterIdLst>
-    <p:notesMasterId r:id="rId15"/>
+    <p:notesMasterId r:id="rId17"/>
   </p:notesMasterIdLst>
   <p:sldIdLst>
     <p:sldId id="282" r:id="rId2"/>
@@ -19,8 +19,10 @@
     <p:sldId id="288" r:id="rId10"/>
     <p:sldId id="295" r:id="rId11"/>
     <p:sldId id="290" r:id="rId12"/>
-    <p:sldId id="281" r:id="rId13"/>
-    <p:sldId id="293" r:id="rId14"/>
+    <p:sldId id="297" r:id="rId13"/>
+    <p:sldId id="296" r:id="rId14"/>
+    <p:sldId id="281" r:id="rId15"/>
+    <p:sldId id="293" r:id="rId16"/>
   </p:sldIdLst>
   <p:sldSz cx="12192000" cy="6858000"/>
   <p:notesSz cx="6858000" cy="9144000"/>
@@ -220,7 +222,7 @@
           <a:p>
             <a:fld id="{8274CD09-5A8E-4049-8F99-1EF01B390FB5}" type="datetimeFigureOut">
               <a:rPr lang="en-US" smtClean="0"/>
-              <a:t>8/4/25</a:t>
+              <a:t>8/5/25</a:t>
             </a:fld>
             <a:endParaRPr lang="en-US"/>
           </a:p>
@@ -718,7 +720,7 @@
           <a:p>
             <a:fld id="{F0B4D847-48B6-E247-A196-936D4C8B419C}" type="datetime1">
               <a:rPr lang="tr-TR" smtClean="0"/>
-              <a:t>4.08.2025</a:t>
+              <a:t>5.08.2025</a:t>
             </a:fld>
             <a:endParaRPr lang="en-US"/>
           </a:p>
@@ -932,7 +934,7 @@
           <a:p>
             <a:fld id="{73F5D0FC-73A8-6443-8E6D-3A3CC73C964C}" type="datetime1">
               <a:rPr lang="tr-TR" smtClean="0"/>
-              <a:t>4.08.2025</a:t>
+              <a:t>5.08.2025</a:t>
             </a:fld>
             <a:endParaRPr lang="en-US"/>
           </a:p>
@@ -1140,7 +1142,7 @@
           <a:p>
             <a:fld id="{54749CDB-730F-1E45-A619-42D9FE7C9154}" type="datetime1">
               <a:rPr lang="tr-TR" smtClean="0"/>
-              <a:t>4.08.2025</a:t>
+              <a:t>5.08.2025</a:t>
             </a:fld>
             <a:endParaRPr lang="en-US"/>
           </a:p>
@@ -1338,7 +1340,7 @@
           <a:p>
             <a:fld id="{B11076EB-D355-4246-8AAC-E77007497CAC}" type="datetime1">
               <a:rPr lang="tr-TR" smtClean="0"/>
-              <a:t>4.08.2025</a:t>
+              <a:t>5.08.2025</a:t>
             </a:fld>
             <a:endParaRPr lang="en-US"/>
           </a:p>
@@ -1613,7 +1615,7 @@
           <a:p>
             <a:fld id="{2A0F1BEF-59A8-5A48-9836-486A7051A799}" type="datetime1">
               <a:rPr lang="tr-TR" smtClean="0"/>
-              <a:t>4.08.2025</a:t>
+              <a:t>5.08.2025</a:t>
             </a:fld>
             <a:endParaRPr lang="en-US"/>
           </a:p>
@@ -1878,7 +1880,7 @@
           <a:p>
             <a:fld id="{EEEA6F31-44B7-1B4D-B489-B4CDAD5EAAE6}" type="datetime1">
               <a:rPr lang="tr-TR" smtClean="0"/>
-              <a:t>4.08.2025</a:t>
+              <a:t>5.08.2025</a:t>
             </a:fld>
             <a:endParaRPr lang="en-US"/>
           </a:p>
@@ -2290,7 +2292,7 @@
           <a:p>
             <a:fld id="{9F0E59AE-8FA2-E945-A0D2-145F08F52119}" type="datetime1">
               <a:rPr lang="tr-TR" smtClean="0"/>
-              <a:t>4.08.2025</a:t>
+              <a:t>5.08.2025</a:t>
             </a:fld>
             <a:endParaRPr lang="en-US"/>
           </a:p>
@@ -2431,7 +2433,7 @@
           <a:p>
             <a:fld id="{42305017-F633-1748-8200-E2F572E64911}" type="datetime1">
               <a:rPr lang="tr-TR" smtClean="0"/>
-              <a:t>4.08.2025</a:t>
+              <a:t>5.08.2025</a:t>
             </a:fld>
             <a:endParaRPr lang="en-US"/>
           </a:p>
@@ -2544,7 +2546,7 @@
           <a:p>
             <a:fld id="{983C2E6C-F380-6A46-86DF-1366832E3638}" type="datetime1">
               <a:rPr lang="tr-TR" smtClean="0"/>
-              <a:t>4.08.2025</a:t>
+              <a:t>5.08.2025</a:t>
             </a:fld>
             <a:endParaRPr lang="en-US"/>
           </a:p>
@@ -2855,7 +2857,7 @@
           <a:p>
             <a:fld id="{644639FF-96DA-F648-884A-B0CBB9E5C59C}" type="datetime1">
               <a:rPr lang="tr-TR" smtClean="0"/>
-              <a:t>4.08.2025</a:t>
+              <a:t>5.08.2025</a:t>
             </a:fld>
             <a:endParaRPr lang="en-US"/>
           </a:p>
@@ -3143,7 +3145,7 @@
           <a:p>
             <a:fld id="{4BAFE78C-5035-6640-A0FB-3707FC735CB8}" type="datetime1">
               <a:rPr lang="tr-TR" smtClean="0"/>
-              <a:t>4.08.2025</a:t>
+              <a:t>5.08.2025</a:t>
             </a:fld>
             <a:endParaRPr lang="en-US"/>
           </a:p>
@@ -3384,7 +3386,7 @@
           <a:p>
             <a:fld id="{AF1EF447-62A8-5B4A-93AC-A3D36ADD9C58}" type="datetime1">
               <a:rPr lang="tr-TR" smtClean="0"/>
-              <a:t>4.08.2025</a:t>
+              <a:t>5.08.2025</a:t>
             </a:fld>
             <a:endParaRPr lang="en-US"/>
           </a:p>
@@ -7771,6 +7773,739 @@
     </p:bg>
     <p:spTree>
       <p:nvGrpSpPr>
+        <p:cNvPr id="1" name="">
+          <a:extLst>
+            <a:ext uri="{FF2B5EF4-FFF2-40B4-BE49-F238E27FC236}">
+              <a16:creationId xmlns:a16="http://schemas.microsoft.com/office/drawing/2014/main" id="{6A5BB8C2-4FFD-3BBA-8B5D-8755A4D5C4F7}"/>
+            </a:ext>
+          </a:extLst>
+        </p:cNvPr>
+        <p:cNvGrpSpPr/>
+        <p:nvPr/>
+      </p:nvGrpSpPr>
+      <p:grpSpPr>
+        <a:xfrm>
+          <a:off x="0" y="0"/>
+          <a:ext cx="0" cy="0"/>
+          <a:chOff x="0" y="0"/>
+          <a:chExt cx="0" cy="0"/>
+        </a:xfrm>
+      </p:grpSpPr>
+      <p:sp>
+        <p:nvSpPr>
+          <p:cNvPr id="24" name="Rectangle 23">
+            <a:extLst>
+              <a:ext uri="{FF2B5EF4-FFF2-40B4-BE49-F238E27FC236}">
+                <a16:creationId xmlns:a16="http://schemas.microsoft.com/office/drawing/2014/main" id="{42A4FC2C-047E-45A5-965D-8E1E3BF09BC6}"/>
+              </a:ext>
+              <a:ext uri="{C183D7F6-B498-43B3-948B-1728B52AA6E4}">
+                <adec:decorative xmlns:adec="http://schemas.microsoft.com/office/drawing/2017/decorative" val="1"/>
+              </a:ext>
+            </a:extLst>
+          </p:cNvPr>
+          <p:cNvSpPr>
+            <a:spLocks noGrp="1" noRot="1" noChangeAspect="1" noMove="1" noResize="1" noEditPoints="1" noAdjustHandles="1" noChangeArrowheads="1" noChangeShapeType="1" noTextEdit="1"/>
+          </p:cNvSpPr>
+          <p:nvPr>
+            <p:extLst>
+              <p:ext uri="{386F3935-93C4-4BCD-93E2-E3B085C9AB24}">
+                <p16:designElem xmlns:p16="http://schemas.microsoft.com/office/powerpoint/2015/main" val="1"/>
+              </p:ext>
+            </p:extLst>
+          </p:nvPr>
+        </p:nvSpPr>
+        <p:spPr bwMode="white">
+          <a:xfrm>
+            <a:off x="1524" y="0"/>
+            <a:ext cx="12188952" cy="6858000"/>
+          </a:xfrm>
+          <a:prstGeom prst="rect">
+            <a:avLst/>
+          </a:prstGeom>
+          <a:noFill/>
+          <a:ln>
+            <a:noFill/>
+          </a:ln>
+        </p:spPr>
+        <p:style>
+          <a:lnRef idx="2">
+            <a:schemeClr val="accent1">
+              <a:shade val="50000"/>
+            </a:schemeClr>
+          </a:lnRef>
+          <a:fillRef idx="1">
+            <a:schemeClr val="accent1"/>
+          </a:fillRef>
+          <a:effectRef idx="0">
+            <a:schemeClr val="accent1"/>
+          </a:effectRef>
+          <a:fontRef idx="minor">
+            <a:schemeClr val="lt1"/>
+          </a:fontRef>
+        </p:style>
+        <p:txBody>
+          <a:bodyPr rtlCol="0" anchor="ctr"/>
+          <a:lstStyle>
+            <a:defPPr>
+              <a:defRPr lang="en-US"/>
+            </a:defPPr>
+            <a:lvl1pPr marL="0" algn="l" defTabSz="914400" rtl="0" eaLnBrk="1" latinLnBrk="0" hangingPunct="1">
+              <a:defRPr sz="1800" kern="1200">
+                <a:solidFill>
+                  <a:schemeClr val="lt1"/>
+                </a:solidFill>
+                <a:latin typeface="+mn-lt"/>
+                <a:ea typeface="+mn-ea"/>
+                <a:cs typeface="+mn-cs"/>
+              </a:defRPr>
+            </a:lvl1pPr>
+            <a:lvl2pPr marL="457200" algn="l" defTabSz="914400" rtl="0" eaLnBrk="1" latinLnBrk="0" hangingPunct="1">
+              <a:defRPr sz="1800" kern="1200">
+                <a:solidFill>
+                  <a:schemeClr val="lt1"/>
+                </a:solidFill>
+                <a:latin typeface="+mn-lt"/>
+                <a:ea typeface="+mn-ea"/>
+                <a:cs typeface="+mn-cs"/>
+              </a:defRPr>
+            </a:lvl2pPr>
+            <a:lvl3pPr marL="914400" algn="l" defTabSz="914400" rtl="0" eaLnBrk="1" latinLnBrk="0" hangingPunct="1">
+              <a:defRPr sz="1800" kern="1200">
+                <a:solidFill>
+                  <a:schemeClr val="lt1"/>
+                </a:solidFill>
+                <a:latin typeface="+mn-lt"/>
+                <a:ea typeface="+mn-ea"/>
+                <a:cs typeface="+mn-cs"/>
+              </a:defRPr>
+            </a:lvl3pPr>
+            <a:lvl4pPr marL="1371600" algn="l" defTabSz="914400" rtl="0" eaLnBrk="1" latinLnBrk="0" hangingPunct="1">
+              <a:defRPr sz="1800" kern="1200">
+                <a:solidFill>
+                  <a:schemeClr val="lt1"/>
+                </a:solidFill>
+                <a:latin typeface="+mn-lt"/>
+                <a:ea typeface="+mn-ea"/>
+                <a:cs typeface="+mn-cs"/>
+              </a:defRPr>
+            </a:lvl4pPr>
+            <a:lvl5pPr marL="1828800" algn="l" defTabSz="914400" rtl="0" eaLnBrk="1" latinLnBrk="0" hangingPunct="1">
+              <a:defRPr sz="1800" kern="1200">
+                <a:solidFill>
+                  <a:schemeClr val="lt1"/>
+                </a:solidFill>
+                <a:latin typeface="+mn-lt"/>
+                <a:ea typeface="+mn-ea"/>
+                <a:cs typeface="+mn-cs"/>
+              </a:defRPr>
+            </a:lvl5pPr>
+            <a:lvl6pPr marL="2286000" algn="l" defTabSz="914400" rtl="0" eaLnBrk="1" latinLnBrk="0" hangingPunct="1">
+              <a:defRPr sz="1800" kern="1200">
+                <a:solidFill>
+                  <a:schemeClr val="lt1"/>
+                </a:solidFill>
+                <a:latin typeface="+mn-lt"/>
+                <a:ea typeface="+mn-ea"/>
+                <a:cs typeface="+mn-cs"/>
+              </a:defRPr>
+            </a:lvl6pPr>
+            <a:lvl7pPr marL="2743200" algn="l" defTabSz="914400" rtl="0" eaLnBrk="1" latinLnBrk="0" hangingPunct="1">
+              <a:defRPr sz="1800" kern="1200">
+                <a:solidFill>
+                  <a:schemeClr val="lt1"/>
+                </a:solidFill>
+                <a:latin typeface="+mn-lt"/>
+                <a:ea typeface="+mn-ea"/>
+                <a:cs typeface="+mn-cs"/>
+              </a:defRPr>
+            </a:lvl7pPr>
+            <a:lvl8pPr marL="3200400" algn="l" defTabSz="914400" rtl="0" eaLnBrk="1" latinLnBrk="0" hangingPunct="1">
+              <a:defRPr sz="1800" kern="1200">
+                <a:solidFill>
+                  <a:schemeClr val="lt1"/>
+                </a:solidFill>
+                <a:latin typeface="+mn-lt"/>
+                <a:ea typeface="+mn-ea"/>
+                <a:cs typeface="+mn-cs"/>
+              </a:defRPr>
+            </a:lvl8pPr>
+            <a:lvl9pPr marL="3657600" algn="l" defTabSz="914400" rtl="0" eaLnBrk="1" latinLnBrk="0" hangingPunct="1">
+              <a:defRPr sz="1800" kern="1200">
+                <a:solidFill>
+                  <a:schemeClr val="lt1"/>
+                </a:solidFill>
+                <a:latin typeface="+mn-lt"/>
+                <a:ea typeface="+mn-ea"/>
+                <a:cs typeface="+mn-cs"/>
+              </a:defRPr>
+            </a:lvl9pPr>
+          </a:lstStyle>
+          <a:p>
+            <a:pPr algn="ctr"/>
+            <a:endParaRPr lang="en-US"/>
+          </a:p>
+        </p:txBody>
+      </p:sp>
+      <p:pic>
+        <p:nvPicPr>
+          <p:cNvPr id="5" name="Content Placeholder 5" descr="A screenshot of a computer&#10;&#10;Description automatically generated">
+            <a:extLst>
+              <a:ext uri="{FF2B5EF4-FFF2-40B4-BE49-F238E27FC236}">
+                <a16:creationId xmlns:a16="http://schemas.microsoft.com/office/drawing/2014/main" id="{89033177-76E9-358A-0B9D-339C49531BD4}"/>
+              </a:ext>
+            </a:extLst>
+          </p:cNvPr>
+          <p:cNvPicPr>
+            <a:picLocks noChangeAspect="1"/>
+          </p:cNvPicPr>
+          <p:nvPr/>
+        </p:nvPicPr>
+        <p:blipFill>
+          <a:blip r:embed="rId2">
+            <a:extLst>
+              <a:ext uri="{28A0092B-C50C-407E-A947-70E740481C1C}">
+                <a14:useLocalDpi xmlns:a14="http://schemas.microsoft.com/office/drawing/2010/main" val="0"/>
+              </a:ext>
+            </a:extLst>
+          </a:blip>
+          <a:srcRect l="13" t="1318" r="-13" b="19192"/>
+          <a:stretch/>
+        </p:blipFill>
+        <p:spPr>
+          <a:xfrm>
+            <a:off x="20" y="1282"/>
+            <a:ext cx="12191980" cy="6856718"/>
+          </a:xfrm>
+          <a:prstGeom prst="rect">
+            <a:avLst/>
+          </a:prstGeom>
+        </p:spPr>
+      </p:pic>
+      <p:sp>
+        <p:nvSpPr>
+          <p:cNvPr id="4" name="Slide Number Placeholder 3">
+            <a:extLst>
+              <a:ext uri="{FF2B5EF4-FFF2-40B4-BE49-F238E27FC236}">
+                <a16:creationId xmlns:a16="http://schemas.microsoft.com/office/drawing/2014/main" id="{2F518D5E-D830-FF1D-2A64-DA701E385FD7}"/>
+              </a:ext>
+            </a:extLst>
+          </p:cNvPr>
+          <p:cNvSpPr>
+            <a:spLocks noGrp="1"/>
+          </p:cNvSpPr>
+          <p:nvPr>
+            <p:ph type="sldNum" sz="quarter" idx="12"/>
+          </p:nvPr>
+        </p:nvSpPr>
+        <p:spPr>
+          <a:xfrm>
+            <a:off x="8610600" y="6356350"/>
+            <a:ext cx="2743200" cy="365125"/>
+          </a:xfrm>
+        </p:spPr>
+        <p:txBody>
+          <a:bodyPr vert="horz" lIns="91440" tIns="45720" rIns="91440" bIns="45720" rtlCol="0" anchor="ctr">
+            <a:normAutofit/>
+          </a:bodyPr>
+          <a:lstStyle/>
+          <a:p>
+            <a:pPr>
+              <a:spcAft>
+                <a:spcPts val="600"/>
+              </a:spcAft>
+            </a:pPr>
+            <a:fld id="{258767BC-73E5-4744-A13B-0B77ED12CA5C}" type="slidenum">
+              <a:rPr lang="en-US">
+                <a:solidFill>
+                  <a:srgbClr val="FFFFFF"/>
+                </a:solidFill>
+              </a:rPr>
+              <a:pPr>
+                <a:spcAft>
+                  <a:spcPts val="600"/>
+                </a:spcAft>
+              </a:pPr>
+              <a:t>12</a:t>
+            </a:fld>
+            <a:endParaRPr lang="en-US">
+              <a:solidFill>
+                <a:srgbClr val="FFFFFF"/>
+              </a:solidFill>
+            </a:endParaRPr>
+          </a:p>
+        </p:txBody>
+      </p:sp>
+    </p:spTree>
+    <p:extLst>
+      <p:ext uri="{BB962C8B-B14F-4D97-AF65-F5344CB8AC3E}">
+        <p14:creationId xmlns:p14="http://schemas.microsoft.com/office/powerpoint/2010/main" val="2269701352"/>
+      </p:ext>
+    </p:extLst>
+  </p:cSld>
+  <p:clrMapOvr>
+    <a:masterClrMapping/>
+  </p:clrMapOvr>
+</p:sld>
+</file>
+
+<file path=ppt/slides/slide13.xml><?xml version="1.0" encoding="utf-8"?>
+<p:sld xmlns:a="http://schemas.openxmlformats.org/drawingml/2006/main" xmlns:r="http://schemas.openxmlformats.org/officeDocument/2006/relationships" xmlns:p="http://schemas.openxmlformats.org/presentationml/2006/main">
+  <p:cSld>
+    <p:spTree>
+      <p:nvGrpSpPr>
+        <p:cNvPr id="1" name=""/>
+        <p:cNvGrpSpPr/>
+        <p:nvPr/>
+      </p:nvGrpSpPr>
+      <p:grpSpPr>
+        <a:xfrm>
+          <a:off x="0" y="0"/>
+          <a:ext cx="0" cy="0"/>
+          <a:chOff x="0" y="0"/>
+          <a:chExt cx="0" cy="0"/>
+        </a:xfrm>
+      </p:grpSpPr>
+      <p:sp useBgFill="1">
+        <p:nvSpPr>
+          <p:cNvPr id="13" name="Rectangle 12">
+            <a:extLst>
+              <a:ext uri="{FF2B5EF4-FFF2-40B4-BE49-F238E27FC236}">
+                <a16:creationId xmlns:a16="http://schemas.microsoft.com/office/drawing/2014/main" id="{2B97F24A-32CE-4C1C-A50D-3016B394DCFB}"/>
+              </a:ext>
+              <a:ext uri="{C183D7F6-B498-43B3-948B-1728B52AA6E4}">
+                <adec:decorative xmlns:adec="http://schemas.microsoft.com/office/drawing/2017/decorative" val="1"/>
+              </a:ext>
+            </a:extLst>
+          </p:cNvPr>
+          <p:cNvSpPr>
+            <a:spLocks noGrp="1" noRot="1" noChangeAspect="1" noMove="1" noResize="1" noEditPoints="1" noAdjustHandles="1" noChangeArrowheads="1" noChangeShapeType="1" noTextEdit="1"/>
+          </p:cNvSpPr>
+          <p:nvPr>
+            <p:extLst>
+              <p:ext uri="{386F3935-93C4-4BCD-93E2-E3B085C9AB24}">
+                <p16:designElem xmlns:p16="http://schemas.microsoft.com/office/powerpoint/2015/main" val="1"/>
+              </p:ext>
+            </p:extLst>
+          </p:nvPr>
+        </p:nvSpPr>
+        <p:spPr>
+          <a:xfrm>
+            <a:off x="0" y="0"/>
+            <a:ext cx="12192000" cy="6858000"/>
+          </a:xfrm>
+          <a:prstGeom prst="rect">
+            <a:avLst/>
+          </a:prstGeom>
+          <a:ln>
+            <a:noFill/>
+          </a:ln>
+        </p:spPr>
+        <p:style>
+          <a:lnRef idx="2">
+            <a:schemeClr val="accent1">
+              <a:shade val="50000"/>
+            </a:schemeClr>
+          </a:lnRef>
+          <a:fillRef idx="1">
+            <a:schemeClr val="accent1"/>
+          </a:fillRef>
+          <a:effectRef idx="0">
+            <a:schemeClr val="accent1"/>
+          </a:effectRef>
+          <a:fontRef idx="minor">
+            <a:schemeClr val="lt1"/>
+          </a:fontRef>
+        </p:style>
+        <p:txBody>
+          <a:bodyPr rtlCol="0" anchor="ctr"/>
+          <a:lstStyle/>
+          <a:p>
+            <a:pPr algn="ctr"/>
+            <a:endParaRPr lang="en-US"/>
+          </a:p>
+        </p:txBody>
+      </p:sp>
+      <p:sp>
+        <p:nvSpPr>
+          <p:cNvPr id="2" name="Title 1">
+            <a:extLst>
+              <a:ext uri="{FF2B5EF4-FFF2-40B4-BE49-F238E27FC236}">
+                <a16:creationId xmlns:a16="http://schemas.microsoft.com/office/drawing/2014/main" id="{F84D5D61-9E30-F625-FBD3-6BB7AF9E1B4B}"/>
+              </a:ext>
+            </a:extLst>
+          </p:cNvPr>
+          <p:cNvSpPr>
+            <a:spLocks noGrp="1"/>
+          </p:cNvSpPr>
+          <p:nvPr>
+            <p:ph type="title"/>
+          </p:nvPr>
+        </p:nvSpPr>
+        <p:spPr>
+          <a:xfrm>
+            <a:off x="630936" y="639520"/>
+            <a:ext cx="3429000" cy="1719072"/>
+          </a:xfrm>
+        </p:spPr>
+        <p:txBody>
+          <a:bodyPr anchor="b">
+            <a:normAutofit/>
+          </a:bodyPr>
+          <a:lstStyle/>
+          <a:p>
+            <a:r>
+              <a:rPr lang="en-US" sz="5400"/>
+              <a:t>Claude Desktop</a:t>
+            </a:r>
+            <a:endParaRPr lang="en-US" sz="5400" dirty="0"/>
+          </a:p>
+        </p:txBody>
+      </p:sp>
+      <p:sp>
+        <p:nvSpPr>
+          <p:cNvPr id="15" name="sketch line">
+            <a:extLst>
+              <a:ext uri="{FF2B5EF4-FFF2-40B4-BE49-F238E27FC236}">
+                <a16:creationId xmlns:a16="http://schemas.microsoft.com/office/drawing/2014/main" id="{6357EC4F-235E-4222-A36F-C7878ACE37F2}"/>
+              </a:ext>
+              <a:ext uri="{C183D7F6-B498-43B3-948B-1728B52AA6E4}">
+                <adec:decorative xmlns:adec="http://schemas.microsoft.com/office/drawing/2017/decorative" val="1"/>
+              </a:ext>
+            </a:extLst>
+          </p:cNvPr>
+          <p:cNvSpPr>
+            <a:spLocks noGrp="1" noRot="1" noChangeAspect="1" noMove="1" noResize="1" noEditPoints="1" noAdjustHandles="1" noChangeArrowheads="1" noChangeShapeType="1" noTextEdit="1"/>
+          </p:cNvSpPr>
+          <p:nvPr>
+            <p:extLst>
+              <p:ext uri="{386F3935-93C4-4BCD-93E2-E3B085C9AB24}">
+                <p16:designElem xmlns:p16="http://schemas.microsoft.com/office/powerpoint/2015/main" val="1"/>
+              </p:ext>
+            </p:extLst>
+          </p:nvPr>
+        </p:nvSpPr>
+        <p:spPr>
+          <a:xfrm>
+            <a:off x="643278" y="2573756"/>
+            <a:ext cx="3255095" cy="18288"/>
+          </a:xfrm>
+          <a:custGeom>
+            <a:avLst/>
+            <a:gdLst>
+              <a:gd name="connsiteX0" fmla="*/ 0 w 3255095"/>
+              <a:gd name="connsiteY0" fmla="*/ 0 h 18288"/>
+              <a:gd name="connsiteX1" fmla="*/ 618468 w 3255095"/>
+              <a:gd name="connsiteY1" fmla="*/ 0 h 18288"/>
+              <a:gd name="connsiteX2" fmla="*/ 1269487 w 3255095"/>
+              <a:gd name="connsiteY2" fmla="*/ 0 h 18288"/>
+              <a:gd name="connsiteX3" fmla="*/ 1953057 w 3255095"/>
+              <a:gd name="connsiteY3" fmla="*/ 0 h 18288"/>
+              <a:gd name="connsiteX4" fmla="*/ 2636627 w 3255095"/>
+              <a:gd name="connsiteY4" fmla="*/ 0 h 18288"/>
+              <a:gd name="connsiteX5" fmla="*/ 3255095 w 3255095"/>
+              <a:gd name="connsiteY5" fmla="*/ 0 h 18288"/>
+              <a:gd name="connsiteX6" fmla="*/ 3255095 w 3255095"/>
+              <a:gd name="connsiteY6" fmla="*/ 18288 h 18288"/>
+              <a:gd name="connsiteX7" fmla="*/ 2538974 w 3255095"/>
+              <a:gd name="connsiteY7" fmla="*/ 18288 h 18288"/>
+              <a:gd name="connsiteX8" fmla="*/ 1822853 w 3255095"/>
+              <a:gd name="connsiteY8" fmla="*/ 18288 h 18288"/>
+              <a:gd name="connsiteX9" fmla="*/ 1171834 w 3255095"/>
+              <a:gd name="connsiteY9" fmla="*/ 18288 h 18288"/>
+              <a:gd name="connsiteX10" fmla="*/ 0 w 3255095"/>
+              <a:gd name="connsiteY10" fmla="*/ 18288 h 18288"/>
+              <a:gd name="connsiteX11" fmla="*/ 0 w 3255095"/>
+              <a:gd name="connsiteY11" fmla="*/ 0 h 18288"/>
+            </a:gdLst>
+            <a:ahLst/>
+            <a:cxnLst>
+              <a:cxn ang="0">
+                <a:pos x="connsiteX0" y="connsiteY0"/>
+              </a:cxn>
+              <a:cxn ang="0">
+                <a:pos x="connsiteX1" y="connsiteY1"/>
+              </a:cxn>
+              <a:cxn ang="0">
+                <a:pos x="connsiteX2" y="connsiteY2"/>
+              </a:cxn>
+              <a:cxn ang="0">
+                <a:pos x="connsiteX3" y="connsiteY3"/>
+              </a:cxn>
+              <a:cxn ang="0">
+                <a:pos x="connsiteX4" y="connsiteY4"/>
+              </a:cxn>
+              <a:cxn ang="0">
+                <a:pos x="connsiteX5" y="connsiteY5"/>
+              </a:cxn>
+              <a:cxn ang="0">
+                <a:pos x="connsiteX6" y="connsiteY6"/>
+              </a:cxn>
+              <a:cxn ang="0">
+                <a:pos x="connsiteX7" y="connsiteY7"/>
+              </a:cxn>
+              <a:cxn ang="0">
+                <a:pos x="connsiteX8" y="connsiteY8"/>
+              </a:cxn>
+              <a:cxn ang="0">
+                <a:pos x="connsiteX9" y="connsiteY9"/>
+              </a:cxn>
+              <a:cxn ang="0">
+                <a:pos x="connsiteX10" y="connsiteY10"/>
+              </a:cxn>
+              <a:cxn ang="0">
+                <a:pos x="connsiteX11" y="connsiteY11"/>
+              </a:cxn>
+            </a:cxnLst>
+            <a:rect l="l" t="t" r="r" b="b"/>
+            <a:pathLst>
+              <a:path w="3255095" h="18288" fill="none" extrusionOk="0">
+                <a:moveTo>
+                  <a:pt x="0" y="0"/>
+                </a:moveTo>
+                <a:cubicBezTo>
+                  <a:pt x="240201" y="-22123"/>
+                  <a:pt x="462021" y="-19623"/>
+                  <a:pt x="618468" y="0"/>
+                </a:cubicBezTo>
+                <a:cubicBezTo>
+                  <a:pt x="774915" y="19623"/>
+                  <a:pt x="974734" y="2035"/>
+                  <a:pt x="1269487" y="0"/>
+                </a:cubicBezTo>
+                <a:cubicBezTo>
+                  <a:pt x="1564240" y="-2035"/>
+                  <a:pt x="1733579" y="10639"/>
+                  <a:pt x="1953057" y="0"/>
+                </a:cubicBezTo>
+                <a:cubicBezTo>
+                  <a:pt x="2172535" y="-10639"/>
+                  <a:pt x="2453962" y="14018"/>
+                  <a:pt x="2636627" y="0"/>
+                </a:cubicBezTo>
+                <a:cubicBezTo>
+                  <a:pt x="2819292" y="-14018"/>
+                  <a:pt x="3121375" y="5399"/>
+                  <a:pt x="3255095" y="0"/>
+                </a:cubicBezTo>
+                <a:cubicBezTo>
+                  <a:pt x="3254386" y="8157"/>
+                  <a:pt x="3254682" y="12125"/>
+                  <a:pt x="3255095" y="18288"/>
+                </a:cubicBezTo>
+                <a:cubicBezTo>
+                  <a:pt x="3088545" y="23203"/>
+                  <a:pt x="2687475" y="7419"/>
+                  <a:pt x="2538974" y="18288"/>
+                </a:cubicBezTo>
+                <a:cubicBezTo>
+                  <a:pt x="2390473" y="29157"/>
+                  <a:pt x="2137381" y="-8959"/>
+                  <a:pt x="1822853" y="18288"/>
+                </a:cubicBezTo>
+                <a:cubicBezTo>
+                  <a:pt x="1508325" y="45535"/>
+                  <a:pt x="1466437" y="20385"/>
+                  <a:pt x="1171834" y="18288"/>
+                </a:cubicBezTo>
+                <a:cubicBezTo>
+                  <a:pt x="877231" y="16191"/>
+                  <a:pt x="561097" y="37643"/>
+                  <a:pt x="0" y="18288"/>
+                </a:cubicBezTo>
+                <a:cubicBezTo>
+                  <a:pt x="-46" y="12483"/>
+                  <a:pt x="-203" y="6491"/>
+                  <a:pt x="0" y="0"/>
+                </a:cubicBezTo>
+                <a:close/>
+              </a:path>
+              <a:path w="3255095" h="18288" stroke="0" extrusionOk="0">
+                <a:moveTo>
+                  <a:pt x="0" y="0"/>
+                </a:moveTo>
+                <a:cubicBezTo>
+                  <a:pt x="291965" y="19429"/>
+                  <a:pt x="363155" y="8568"/>
+                  <a:pt x="618468" y="0"/>
+                </a:cubicBezTo>
+                <a:cubicBezTo>
+                  <a:pt x="873781" y="-8568"/>
+                  <a:pt x="904459" y="-19505"/>
+                  <a:pt x="1171834" y="0"/>
+                </a:cubicBezTo>
+                <a:cubicBezTo>
+                  <a:pt x="1439209" y="19505"/>
+                  <a:pt x="1744369" y="9790"/>
+                  <a:pt x="1887955" y="0"/>
+                </a:cubicBezTo>
+                <a:cubicBezTo>
+                  <a:pt x="2031541" y="-9790"/>
+                  <a:pt x="2346378" y="21240"/>
+                  <a:pt x="2506423" y="0"/>
+                </a:cubicBezTo>
+                <a:cubicBezTo>
+                  <a:pt x="2666468" y="-21240"/>
+                  <a:pt x="2990257" y="30414"/>
+                  <a:pt x="3255095" y="0"/>
+                </a:cubicBezTo>
+                <a:cubicBezTo>
+                  <a:pt x="3254831" y="4493"/>
+                  <a:pt x="3255479" y="9472"/>
+                  <a:pt x="3255095" y="18288"/>
+                </a:cubicBezTo>
+                <a:cubicBezTo>
+                  <a:pt x="3120743" y="16690"/>
+                  <a:pt x="2759628" y="42462"/>
+                  <a:pt x="2604076" y="18288"/>
+                </a:cubicBezTo>
+                <a:cubicBezTo>
+                  <a:pt x="2448524" y="-5886"/>
+                  <a:pt x="2184336" y="19599"/>
+                  <a:pt x="1887955" y="18288"/>
+                </a:cubicBezTo>
+                <a:cubicBezTo>
+                  <a:pt x="1591574" y="16977"/>
+                  <a:pt x="1548845" y="6870"/>
+                  <a:pt x="1334589" y="18288"/>
+                </a:cubicBezTo>
+                <a:cubicBezTo>
+                  <a:pt x="1120333" y="29706"/>
+                  <a:pt x="996014" y="9662"/>
+                  <a:pt x="683570" y="18288"/>
+                </a:cubicBezTo>
+                <a:cubicBezTo>
+                  <a:pt x="371126" y="26914"/>
+                  <a:pt x="198687" y="16167"/>
+                  <a:pt x="0" y="18288"/>
+                </a:cubicBezTo>
+                <a:cubicBezTo>
+                  <a:pt x="843" y="9577"/>
+                  <a:pt x="371" y="6900"/>
+                  <a:pt x="0" y="0"/>
+                </a:cubicBezTo>
+                <a:close/>
+              </a:path>
+            </a:pathLst>
+          </a:custGeom>
+          <a:solidFill>
+            <a:schemeClr val="accent2"/>
+          </a:solidFill>
+          <a:ln w="38100" cap="rnd">
+            <a:solidFill>
+              <a:schemeClr val="accent2"/>
+            </a:solidFill>
+            <a:round/>
+            <a:extLst>
+              <a:ext uri="{C807C97D-BFC1-408E-A445-0C87EB9F89A2}">
+                <ask:lineSketchStyleProps xmlns:ask="http://schemas.microsoft.com/office/drawing/2018/sketchyshapes" sd="1219033472">
+                  <a:prstGeom prst="rect">
+                    <a:avLst/>
+                  </a:prstGeom>
+                  <ask:type>
+                    <ask:lineSketchFreehand/>
+                  </ask:type>
+                </ask:lineSketchStyleProps>
+              </a:ext>
+            </a:extLst>
+          </a:ln>
+        </p:spPr>
+        <p:style>
+          <a:lnRef idx="2">
+            <a:schemeClr val="accent1">
+              <a:shade val="50000"/>
+            </a:schemeClr>
+          </a:lnRef>
+          <a:fillRef idx="1">
+            <a:schemeClr val="accent1"/>
+          </a:fillRef>
+          <a:effectRef idx="0">
+            <a:schemeClr val="accent1"/>
+          </a:effectRef>
+          <a:fontRef idx="minor">
+            <a:schemeClr val="lt1"/>
+          </a:fontRef>
+        </p:style>
+        <p:txBody>
+          <a:bodyPr rtlCol="0" anchor="ctr"/>
+          <a:lstStyle/>
+          <a:p>
+            <a:pPr algn="ctr"/>
+            <a:endParaRPr lang="en-US"/>
+          </a:p>
+        </p:txBody>
+      </p:sp>
+      <p:sp>
+        <p:nvSpPr>
+          <p:cNvPr id="4" name="Slide Number Placeholder 3">
+            <a:extLst>
+              <a:ext uri="{FF2B5EF4-FFF2-40B4-BE49-F238E27FC236}">
+                <a16:creationId xmlns:a16="http://schemas.microsoft.com/office/drawing/2014/main" id="{F3E5D363-0EBE-3B6C-3845-19890FC5D3D6}"/>
+              </a:ext>
+            </a:extLst>
+          </p:cNvPr>
+          <p:cNvSpPr>
+            <a:spLocks noGrp="1"/>
+          </p:cNvSpPr>
+          <p:nvPr>
+            <p:ph type="sldNum" sz="quarter" idx="12"/>
+          </p:nvPr>
+        </p:nvSpPr>
+        <p:spPr>
+          <a:xfrm>
+            <a:off x="8610600" y="6356350"/>
+            <a:ext cx="2743200" cy="365125"/>
+          </a:xfrm>
+        </p:spPr>
+        <p:txBody>
+          <a:bodyPr>
+            <a:normAutofit/>
+          </a:bodyPr>
+          <a:lstStyle/>
+          <a:p>
+            <a:pPr>
+              <a:spcAft>
+                <a:spcPts val="600"/>
+              </a:spcAft>
+            </a:pPr>
+            <a:fld id="{258767BC-73E5-4744-A13B-0B77ED12CA5C}" type="slidenum">
+              <a:rPr lang="en-US" smtClean="0"/>
+              <a:pPr>
+                <a:spcAft>
+                  <a:spcPts val="600"/>
+                </a:spcAft>
+              </a:pPr>
+              <a:t>13</a:t>
+            </a:fld>
+            <a:endParaRPr lang="en-US"/>
+          </a:p>
+        </p:txBody>
+      </p:sp>
+    </p:spTree>
+    <p:extLst>
+      <p:ext uri="{BB962C8B-B14F-4D97-AF65-F5344CB8AC3E}">
+        <p14:creationId xmlns:p14="http://schemas.microsoft.com/office/powerpoint/2010/main" val="821137254"/>
+      </p:ext>
+    </p:extLst>
+  </p:cSld>
+  <p:clrMapOvr>
+    <a:masterClrMapping/>
+  </p:clrMapOvr>
+</p:sld>
+</file>
+
+<file path=ppt/slides/slide14.xml><?xml version="1.0" encoding="utf-8"?>
+<p:sld xmlns:a="http://schemas.openxmlformats.org/drawingml/2006/main" xmlns:r="http://schemas.openxmlformats.org/officeDocument/2006/relationships" xmlns:p="http://schemas.openxmlformats.org/presentationml/2006/main">
+  <p:cSld>
+    <p:bg>
+      <p:bgPr>
+        <a:solidFill>
+          <a:schemeClr val="bg1"/>
+        </a:solidFill>
+        <a:effectLst/>
+      </p:bgPr>
+    </p:bg>
+    <p:spTree>
+      <p:nvGrpSpPr>
         <p:cNvPr id="1" name=""/>
         <p:cNvGrpSpPr/>
         <p:nvPr/>
@@ -8119,7 +8854,7 @@
           <a:p>
             <a:fld id="{258767BC-73E5-4744-A13B-0B77ED12CA5C}" type="slidenum">
               <a:rPr lang="en-US" smtClean="0"/>
-              <a:t>12</a:t>
+              <a:t>14</a:t>
             </a:fld>
             <a:endParaRPr lang="en-US"/>
           </a:p>
@@ -8230,7 +8965,7 @@
 </p:sld>
 </file>
 
-<file path=ppt/slides/slide13.xml><?xml version="1.0" encoding="utf-8"?>
+<file path=ppt/slides/slide15.xml><?xml version="1.0" encoding="utf-8"?>
 <p:sld xmlns:a="http://schemas.openxmlformats.org/drawingml/2006/main" xmlns:r="http://schemas.openxmlformats.org/officeDocument/2006/relationships" xmlns:p="http://schemas.openxmlformats.org/presentationml/2006/main">
   <p:cSld>
     <p:bg>
@@ -9101,7 +9836,7 @@
                   <a:spcPts val="600"/>
                 </a:spcAft>
               </a:pPr>
-              <a:t>13</a:t>
+              <a:t>15</a:t>
             </a:fld>
             <a:endParaRPr lang="en-US"/>
           </a:p>

</xml_diff>